<commit_message>
#45-Typee Global S/W Architecture Documentation
Added three figures in section 2.1 the Front-End
</commit_message>
<xml_diff>
--- a/_Global_Documentation/Picts/typee-design-all-figures.pptx
+++ b/_Global_Documentation/Picts/typee-design-all-figures.pptx
@@ -6,6 +6,7 @@
   </p:sldMasterIdLst>
   <p:sldIdLst>
     <p:sldId id="256" r:id="rId2"/>
+    <p:sldId id="257" r:id="rId3"/>
   </p:sldIdLst>
   <p:sldSz cx="12192000" cy="6858000"/>
   <p:notesSz cx="6858000" cy="9144000"/>
@@ -104,6 +105,11 @@
       </a:defRPr>
     </a:lvl9pPr>
   </p:defaultTextStyle>
+  <p:extLst>
+    <p:ext uri="{EFAFB233-063F-42B5-8137-9DF3F51BA10A}">
+      <p15:sldGuideLst xmlns:p15="http://schemas.microsoft.com/office/powerpoint/2012/main"/>
+    </p:ext>
+  </p:extLst>
 </p:presentation>
 </file>
 
@@ -254,7 +260,7 @@
           <a:p>
             <a:fld id="{CB305606-2FC6-48E3-B3BE-D924FB5B3099}" type="datetimeFigureOut">
               <a:rPr lang="fr-FR" smtClean="0"/>
-              <a:t>09/08/2018</a:t>
+              <a:t>10/08/2018</a:t>
             </a:fld>
             <a:endParaRPr lang="fr-FR"/>
           </a:p>
@@ -452,7 +458,7 @@
           <a:p>
             <a:fld id="{CB305606-2FC6-48E3-B3BE-D924FB5B3099}" type="datetimeFigureOut">
               <a:rPr lang="fr-FR" smtClean="0"/>
-              <a:t>09/08/2018</a:t>
+              <a:t>10/08/2018</a:t>
             </a:fld>
             <a:endParaRPr lang="fr-FR"/>
           </a:p>
@@ -660,7 +666,7 @@
           <a:p>
             <a:fld id="{CB305606-2FC6-48E3-B3BE-D924FB5B3099}" type="datetimeFigureOut">
               <a:rPr lang="fr-FR" smtClean="0"/>
-              <a:t>09/08/2018</a:t>
+              <a:t>10/08/2018</a:t>
             </a:fld>
             <a:endParaRPr lang="fr-FR"/>
           </a:p>
@@ -858,7 +864,7 @@
           <a:p>
             <a:fld id="{CB305606-2FC6-48E3-B3BE-D924FB5B3099}" type="datetimeFigureOut">
               <a:rPr lang="fr-FR" smtClean="0"/>
-              <a:t>09/08/2018</a:t>
+              <a:t>10/08/2018</a:t>
             </a:fld>
             <a:endParaRPr lang="fr-FR"/>
           </a:p>
@@ -1133,7 +1139,7 @@
           <a:p>
             <a:fld id="{CB305606-2FC6-48E3-B3BE-D924FB5B3099}" type="datetimeFigureOut">
               <a:rPr lang="fr-FR" smtClean="0"/>
-              <a:t>09/08/2018</a:t>
+              <a:t>10/08/2018</a:t>
             </a:fld>
             <a:endParaRPr lang="fr-FR"/>
           </a:p>
@@ -1398,7 +1404,7 @@
           <a:p>
             <a:fld id="{CB305606-2FC6-48E3-B3BE-D924FB5B3099}" type="datetimeFigureOut">
               <a:rPr lang="fr-FR" smtClean="0"/>
-              <a:t>09/08/2018</a:t>
+              <a:t>10/08/2018</a:t>
             </a:fld>
             <a:endParaRPr lang="fr-FR"/>
           </a:p>
@@ -1810,7 +1816,7 @@
           <a:p>
             <a:fld id="{CB305606-2FC6-48E3-B3BE-D924FB5B3099}" type="datetimeFigureOut">
               <a:rPr lang="fr-FR" smtClean="0"/>
-              <a:t>09/08/2018</a:t>
+              <a:t>10/08/2018</a:t>
             </a:fld>
             <a:endParaRPr lang="fr-FR"/>
           </a:p>
@@ -1951,7 +1957,7 @@
           <a:p>
             <a:fld id="{CB305606-2FC6-48E3-B3BE-D924FB5B3099}" type="datetimeFigureOut">
               <a:rPr lang="fr-FR" smtClean="0"/>
-              <a:t>09/08/2018</a:t>
+              <a:t>10/08/2018</a:t>
             </a:fld>
             <a:endParaRPr lang="fr-FR"/>
           </a:p>
@@ -2064,7 +2070,7 @@
           <a:p>
             <a:fld id="{CB305606-2FC6-48E3-B3BE-D924FB5B3099}" type="datetimeFigureOut">
               <a:rPr lang="fr-FR" smtClean="0"/>
-              <a:t>09/08/2018</a:t>
+              <a:t>10/08/2018</a:t>
             </a:fld>
             <a:endParaRPr lang="fr-FR"/>
           </a:p>
@@ -2375,7 +2381,7 @@
           <a:p>
             <a:fld id="{CB305606-2FC6-48E3-B3BE-D924FB5B3099}" type="datetimeFigureOut">
               <a:rPr lang="fr-FR" smtClean="0"/>
-              <a:t>09/08/2018</a:t>
+              <a:t>10/08/2018</a:t>
             </a:fld>
             <a:endParaRPr lang="fr-FR"/>
           </a:p>
@@ -2663,7 +2669,7 @@
           <a:p>
             <a:fld id="{CB305606-2FC6-48E3-B3BE-D924FB5B3099}" type="datetimeFigureOut">
               <a:rPr lang="fr-FR" smtClean="0"/>
-              <a:t>09/08/2018</a:t>
+              <a:t>10/08/2018</a:t>
             </a:fld>
             <a:endParaRPr lang="fr-FR"/>
           </a:p>
@@ -2904,7 +2910,7 @@
           <a:p>
             <a:fld id="{CB305606-2FC6-48E3-B3BE-D924FB5B3099}" type="datetimeFigureOut">
               <a:rPr lang="fr-FR" smtClean="0"/>
-              <a:t>09/08/2018</a:t>
+              <a:t>10/08/2018</a:t>
             </a:fld>
             <a:endParaRPr lang="fr-FR"/>
           </a:p>
@@ -4245,10 +4251,2072 @@
           </a:p>
         </p:txBody>
       </p:sp>
+      <p:sp>
+        <p:nvSpPr>
+          <p:cNvPr id="24" name="Rectangle : coins arrondis 23">
+            <a:extLst>
+              <a:ext uri="{FF2B5EF4-FFF2-40B4-BE49-F238E27FC236}">
+                <a16:creationId xmlns:a16="http://schemas.microsoft.com/office/drawing/2014/main" id="{D6B4AC0F-0713-4FCD-9493-522562EF145E}"/>
+              </a:ext>
+            </a:extLst>
+          </p:cNvPr>
+          <p:cNvSpPr/>
+          <p:nvPr/>
+        </p:nvSpPr>
+        <p:spPr>
+          <a:xfrm>
+            <a:off x="2538548" y="4534269"/>
+            <a:ext cx="5695406" cy="678594"/>
+          </a:xfrm>
+          <a:prstGeom prst="roundRect">
+            <a:avLst/>
+          </a:prstGeom>
+          <a:ln/>
+        </p:spPr>
+        <p:style>
+          <a:lnRef idx="1">
+            <a:schemeClr val="accent5"/>
+          </a:lnRef>
+          <a:fillRef idx="2">
+            <a:schemeClr val="accent5"/>
+          </a:fillRef>
+          <a:effectRef idx="1">
+            <a:schemeClr val="accent5"/>
+          </a:effectRef>
+          <a:fontRef idx="minor">
+            <a:schemeClr val="dk1"/>
+          </a:fontRef>
+        </p:style>
+        <p:txBody>
+          <a:bodyPr rtlCol="0" anchor="ctr"/>
+          <a:lstStyle/>
+          <a:p>
+            <a:pPr algn="ctr"/>
+            <a:endParaRPr lang="fr-FR"/>
+          </a:p>
+        </p:txBody>
+      </p:sp>
+      <p:sp>
+        <p:nvSpPr>
+          <p:cNvPr id="25" name="ZoneTexte 24">
+            <a:extLst>
+              <a:ext uri="{FF2B5EF4-FFF2-40B4-BE49-F238E27FC236}">
+                <a16:creationId xmlns:a16="http://schemas.microsoft.com/office/drawing/2014/main" id="{624CC755-CCE6-4DBB-8C8F-5E3C2F1601AE}"/>
+              </a:ext>
+            </a:extLst>
+          </p:cNvPr>
+          <p:cNvSpPr txBox="1"/>
+          <p:nvPr/>
+        </p:nvSpPr>
+        <p:spPr>
+          <a:xfrm>
+            <a:off x="2643052" y="4710955"/>
+            <a:ext cx="1240971" cy="369332"/>
+          </a:xfrm>
+          <a:prstGeom prst="rect">
+            <a:avLst/>
+          </a:prstGeom>
+        </p:spPr>
+        <p:style>
+          <a:lnRef idx="0">
+            <a:schemeClr val="accent5"/>
+          </a:lnRef>
+          <a:fillRef idx="3">
+            <a:schemeClr val="accent5"/>
+          </a:fillRef>
+          <a:effectRef idx="3">
+            <a:schemeClr val="accent5"/>
+          </a:effectRef>
+          <a:fontRef idx="minor">
+            <a:schemeClr val="lt1"/>
+          </a:fontRef>
+        </p:style>
+        <p:txBody>
+          <a:bodyPr wrap="square" rtlCol="0">
+            <a:spAutoFit/>
+          </a:bodyPr>
+          <a:lstStyle/>
+          <a:p>
+            <a:r>
+              <a:rPr lang="fr-FR" dirty="0"/>
+              <a:t>Scanner</a:t>
+            </a:r>
+          </a:p>
+        </p:txBody>
+      </p:sp>
+      <p:sp>
+        <p:nvSpPr>
+          <p:cNvPr id="28" name="ZoneTexte 27">
+            <a:extLst>
+              <a:ext uri="{FF2B5EF4-FFF2-40B4-BE49-F238E27FC236}">
+                <a16:creationId xmlns:a16="http://schemas.microsoft.com/office/drawing/2014/main" id="{0FBB954C-F038-4174-B1F4-4E3F0C731079}"/>
+              </a:ext>
+            </a:extLst>
+          </p:cNvPr>
+          <p:cNvSpPr txBox="1"/>
+          <p:nvPr/>
+        </p:nvSpPr>
+        <p:spPr>
+          <a:xfrm>
+            <a:off x="4781006" y="4710955"/>
+            <a:ext cx="1240971" cy="369332"/>
+          </a:xfrm>
+          <a:prstGeom prst="rect">
+            <a:avLst/>
+          </a:prstGeom>
+          <a:ln/>
+        </p:spPr>
+        <p:style>
+          <a:lnRef idx="0">
+            <a:schemeClr val="accent5"/>
+          </a:lnRef>
+          <a:fillRef idx="3">
+            <a:schemeClr val="accent5"/>
+          </a:fillRef>
+          <a:effectRef idx="3">
+            <a:schemeClr val="accent5"/>
+          </a:effectRef>
+          <a:fontRef idx="minor">
+            <a:schemeClr val="lt1"/>
+          </a:fontRef>
+        </p:style>
+        <p:txBody>
+          <a:bodyPr wrap="square" rtlCol="0">
+            <a:spAutoFit/>
+          </a:bodyPr>
+          <a:lstStyle/>
+          <a:p>
+            <a:r>
+              <a:rPr lang="fr-FR" dirty="0" err="1"/>
+              <a:t>Parser</a:t>
+            </a:r>
+            <a:endParaRPr lang="fr-FR" dirty="0"/>
+          </a:p>
+        </p:txBody>
+      </p:sp>
+      <p:sp>
+        <p:nvSpPr>
+          <p:cNvPr id="29" name="ZoneTexte 28">
+            <a:extLst>
+              <a:ext uri="{FF2B5EF4-FFF2-40B4-BE49-F238E27FC236}">
+                <a16:creationId xmlns:a16="http://schemas.microsoft.com/office/drawing/2014/main" id="{9821C986-438C-4368-8B77-281516181259}"/>
+              </a:ext>
+            </a:extLst>
+          </p:cNvPr>
+          <p:cNvSpPr txBox="1"/>
+          <p:nvPr/>
+        </p:nvSpPr>
+        <p:spPr>
+          <a:xfrm>
+            <a:off x="6918960" y="4710955"/>
+            <a:ext cx="1240971" cy="369332"/>
+          </a:xfrm>
+          <a:prstGeom prst="rect">
+            <a:avLst/>
+          </a:prstGeom>
+          <a:ln/>
+        </p:spPr>
+        <p:style>
+          <a:lnRef idx="0">
+            <a:schemeClr val="accent5"/>
+          </a:lnRef>
+          <a:fillRef idx="3">
+            <a:schemeClr val="accent5"/>
+          </a:fillRef>
+          <a:effectRef idx="3">
+            <a:schemeClr val="accent5"/>
+          </a:effectRef>
+          <a:fontRef idx="minor">
+            <a:schemeClr val="lt1"/>
+          </a:fontRef>
+        </p:style>
+        <p:txBody>
+          <a:bodyPr wrap="square" rtlCol="0">
+            <a:spAutoFit/>
+          </a:bodyPr>
+          <a:lstStyle/>
+          <a:p>
+            <a:r>
+              <a:rPr lang="fr-FR" dirty="0" err="1"/>
+              <a:t>Elaborator</a:t>
+            </a:r>
+            <a:endParaRPr lang="fr-FR" dirty="0"/>
+          </a:p>
+        </p:txBody>
+      </p:sp>
+      <p:cxnSp>
+        <p:nvCxnSpPr>
+          <p:cNvPr id="30" name="Connecteur droit avec flèche 29">
+            <a:extLst>
+              <a:ext uri="{FF2B5EF4-FFF2-40B4-BE49-F238E27FC236}">
+                <a16:creationId xmlns:a16="http://schemas.microsoft.com/office/drawing/2014/main" id="{97F852B4-EDA5-49DC-9284-8F6E11F09000}"/>
+              </a:ext>
+            </a:extLst>
+          </p:cNvPr>
+          <p:cNvCxnSpPr>
+            <a:stCxn id="25" idx="3"/>
+            <a:endCxn id="28" idx="1"/>
+          </p:cNvCxnSpPr>
+          <p:nvPr/>
+        </p:nvCxnSpPr>
+        <p:spPr>
+          <a:xfrm>
+            <a:off x="3884023" y="4895621"/>
+            <a:ext cx="896983" cy="0"/>
+          </a:xfrm>
+          <a:prstGeom prst="straightConnector1">
+            <a:avLst/>
+          </a:prstGeom>
+          <a:ln>
+            <a:tailEnd type="triangle"/>
+          </a:ln>
+        </p:spPr>
+        <p:style>
+          <a:lnRef idx="3">
+            <a:schemeClr val="accent1"/>
+          </a:lnRef>
+          <a:fillRef idx="0">
+            <a:schemeClr val="accent1"/>
+          </a:fillRef>
+          <a:effectRef idx="2">
+            <a:schemeClr val="accent1"/>
+          </a:effectRef>
+          <a:fontRef idx="minor">
+            <a:schemeClr val="tx1"/>
+          </a:fontRef>
+        </p:style>
+      </p:cxnSp>
+      <p:cxnSp>
+        <p:nvCxnSpPr>
+          <p:cNvPr id="31" name="Connecteur droit avec flèche 30">
+            <a:extLst>
+              <a:ext uri="{FF2B5EF4-FFF2-40B4-BE49-F238E27FC236}">
+                <a16:creationId xmlns:a16="http://schemas.microsoft.com/office/drawing/2014/main" id="{F4379EBA-8861-4595-8A2B-2CA99F980D93}"/>
+              </a:ext>
+            </a:extLst>
+          </p:cNvPr>
+          <p:cNvCxnSpPr/>
+          <p:nvPr/>
+        </p:nvCxnSpPr>
+        <p:spPr>
+          <a:xfrm>
+            <a:off x="6021977" y="4895621"/>
+            <a:ext cx="896983" cy="0"/>
+          </a:xfrm>
+          <a:prstGeom prst="straightConnector1">
+            <a:avLst/>
+          </a:prstGeom>
+          <a:ln>
+            <a:tailEnd type="triangle"/>
+          </a:ln>
+        </p:spPr>
+        <p:style>
+          <a:lnRef idx="3">
+            <a:schemeClr val="accent1"/>
+          </a:lnRef>
+          <a:fillRef idx="0">
+            <a:schemeClr val="accent1"/>
+          </a:fillRef>
+          <a:effectRef idx="2">
+            <a:schemeClr val="accent1"/>
+          </a:effectRef>
+          <a:fontRef idx="minor">
+            <a:schemeClr val="tx1"/>
+          </a:fontRef>
+        </p:style>
+      </p:cxnSp>
+      <p:cxnSp>
+        <p:nvCxnSpPr>
+          <p:cNvPr id="32" name="Connecteur droit avec flèche 31">
+            <a:extLst>
+              <a:ext uri="{FF2B5EF4-FFF2-40B4-BE49-F238E27FC236}">
+                <a16:creationId xmlns:a16="http://schemas.microsoft.com/office/drawing/2014/main" id="{69E9B84A-F3EC-4D83-AB39-AE1F2DCFD5A3}"/>
+              </a:ext>
+            </a:extLst>
+          </p:cNvPr>
+          <p:cNvCxnSpPr/>
+          <p:nvPr/>
+        </p:nvCxnSpPr>
+        <p:spPr>
+          <a:xfrm>
+            <a:off x="8159931" y="4879989"/>
+            <a:ext cx="896983" cy="0"/>
+          </a:xfrm>
+          <a:prstGeom prst="straightConnector1">
+            <a:avLst/>
+          </a:prstGeom>
+          <a:ln>
+            <a:tailEnd type="triangle"/>
+          </a:ln>
+        </p:spPr>
+        <p:style>
+          <a:lnRef idx="3">
+            <a:schemeClr val="accent1"/>
+          </a:lnRef>
+          <a:fillRef idx="0">
+            <a:schemeClr val="accent1"/>
+          </a:fillRef>
+          <a:effectRef idx="2">
+            <a:schemeClr val="accent1"/>
+          </a:effectRef>
+          <a:fontRef idx="minor">
+            <a:schemeClr val="tx1"/>
+          </a:fontRef>
+        </p:style>
+      </p:cxnSp>
+      <p:cxnSp>
+        <p:nvCxnSpPr>
+          <p:cNvPr id="33" name="Connecteur droit avec flèche 32">
+            <a:extLst>
+              <a:ext uri="{FF2B5EF4-FFF2-40B4-BE49-F238E27FC236}">
+                <a16:creationId xmlns:a16="http://schemas.microsoft.com/office/drawing/2014/main" id="{CDB4EC11-42C0-4B1A-ABD7-5618906043D8}"/>
+              </a:ext>
+            </a:extLst>
+          </p:cNvPr>
+          <p:cNvCxnSpPr/>
+          <p:nvPr/>
+        </p:nvCxnSpPr>
+        <p:spPr>
+          <a:xfrm>
+            <a:off x="1746069" y="4889701"/>
+            <a:ext cx="896983" cy="0"/>
+          </a:xfrm>
+          <a:prstGeom prst="straightConnector1">
+            <a:avLst/>
+          </a:prstGeom>
+          <a:ln>
+            <a:tailEnd type="triangle"/>
+          </a:ln>
+        </p:spPr>
+        <p:style>
+          <a:lnRef idx="3">
+            <a:schemeClr val="accent1"/>
+          </a:lnRef>
+          <a:fillRef idx="0">
+            <a:schemeClr val="accent1"/>
+          </a:fillRef>
+          <a:effectRef idx="2">
+            <a:schemeClr val="accent1"/>
+          </a:effectRef>
+          <a:fontRef idx="minor">
+            <a:schemeClr val="tx1"/>
+          </a:fontRef>
+        </p:style>
+      </p:cxnSp>
+      <p:sp>
+        <p:nvSpPr>
+          <p:cNvPr id="34" name="ZoneTexte 33">
+            <a:extLst>
+              <a:ext uri="{FF2B5EF4-FFF2-40B4-BE49-F238E27FC236}">
+                <a16:creationId xmlns:a16="http://schemas.microsoft.com/office/drawing/2014/main" id="{B819D193-1349-4022-AE8A-A9EE55B4A8C6}"/>
+              </a:ext>
+            </a:extLst>
+          </p:cNvPr>
+          <p:cNvSpPr txBox="1"/>
+          <p:nvPr/>
+        </p:nvSpPr>
+        <p:spPr>
+          <a:xfrm>
+            <a:off x="1598023" y="4566535"/>
+            <a:ext cx="940525" cy="646331"/>
+          </a:xfrm>
+          <a:prstGeom prst="rect">
+            <a:avLst/>
+          </a:prstGeom>
+          <a:noFill/>
+        </p:spPr>
+        <p:txBody>
+          <a:bodyPr wrap="square" rtlCol="0">
+            <a:spAutoFit/>
+          </a:bodyPr>
+          <a:lstStyle/>
+          <a:p>
+            <a:r>
+              <a:rPr lang="fr-FR" dirty="0">
+                <a:solidFill>
+                  <a:srgbClr val="0070C0"/>
+                </a:solidFill>
+              </a:rPr>
+              <a:t>Source code</a:t>
+            </a:r>
+          </a:p>
+        </p:txBody>
+      </p:sp>
+      <p:sp>
+        <p:nvSpPr>
+          <p:cNvPr id="35" name="ZoneTexte 34">
+            <a:extLst>
+              <a:ext uri="{FF2B5EF4-FFF2-40B4-BE49-F238E27FC236}">
+                <a16:creationId xmlns:a16="http://schemas.microsoft.com/office/drawing/2014/main" id="{53985249-9EFE-45CA-89C3-4ECFF3BC3AA7}"/>
+              </a:ext>
+            </a:extLst>
+          </p:cNvPr>
+          <p:cNvSpPr txBox="1"/>
+          <p:nvPr/>
+        </p:nvSpPr>
+        <p:spPr>
+          <a:xfrm>
+            <a:off x="4040777" y="4510986"/>
+            <a:ext cx="600891" cy="369332"/>
+          </a:xfrm>
+          <a:prstGeom prst="rect">
+            <a:avLst/>
+          </a:prstGeom>
+          <a:noFill/>
+        </p:spPr>
+        <p:txBody>
+          <a:bodyPr wrap="square" rtlCol="0">
+            <a:spAutoFit/>
+          </a:bodyPr>
+          <a:lstStyle/>
+          <a:p>
+            <a:r>
+              <a:rPr lang="fr-FR" dirty="0">
+                <a:solidFill>
+                  <a:srgbClr val="0070C0"/>
+                </a:solidFill>
+              </a:rPr>
+              <a:t>I.C.</a:t>
+            </a:r>
+          </a:p>
+        </p:txBody>
+      </p:sp>
+      <p:sp>
+        <p:nvSpPr>
+          <p:cNvPr id="36" name="ZoneTexte 35">
+            <a:extLst>
+              <a:ext uri="{FF2B5EF4-FFF2-40B4-BE49-F238E27FC236}">
+                <a16:creationId xmlns:a16="http://schemas.microsoft.com/office/drawing/2014/main" id="{62391610-36DB-46B2-8CC5-8C4E2469FE27}"/>
+              </a:ext>
+            </a:extLst>
+          </p:cNvPr>
+          <p:cNvSpPr txBox="1"/>
+          <p:nvPr/>
+        </p:nvSpPr>
+        <p:spPr>
+          <a:xfrm>
+            <a:off x="6170023" y="4534268"/>
+            <a:ext cx="600891" cy="369332"/>
+          </a:xfrm>
+          <a:prstGeom prst="rect">
+            <a:avLst/>
+          </a:prstGeom>
+          <a:noFill/>
+        </p:spPr>
+        <p:txBody>
+          <a:bodyPr wrap="square" rtlCol="0">
+            <a:spAutoFit/>
+          </a:bodyPr>
+          <a:lstStyle/>
+          <a:p>
+            <a:r>
+              <a:rPr lang="fr-FR" dirty="0">
+                <a:solidFill>
+                  <a:srgbClr val="0070C0"/>
+                </a:solidFill>
+              </a:rPr>
+              <a:t>I.C.</a:t>
+            </a:r>
+          </a:p>
+        </p:txBody>
+      </p:sp>
+      <p:sp>
+        <p:nvSpPr>
+          <p:cNvPr id="37" name="ZoneTexte 36">
+            <a:extLst>
+              <a:ext uri="{FF2B5EF4-FFF2-40B4-BE49-F238E27FC236}">
+                <a16:creationId xmlns:a16="http://schemas.microsoft.com/office/drawing/2014/main" id="{25EDB31B-A9FD-4DFA-B8D1-D2FF49FDE306}"/>
+              </a:ext>
+            </a:extLst>
+          </p:cNvPr>
+          <p:cNvSpPr txBox="1"/>
+          <p:nvPr/>
+        </p:nvSpPr>
+        <p:spPr>
+          <a:xfrm>
+            <a:off x="8556170" y="4566535"/>
+            <a:ext cx="1206137" cy="369332"/>
+          </a:xfrm>
+          <a:prstGeom prst="rect">
+            <a:avLst/>
+          </a:prstGeom>
+          <a:noFill/>
+        </p:spPr>
+        <p:txBody>
+          <a:bodyPr wrap="square" rtlCol="0">
+            <a:spAutoFit/>
+          </a:bodyPr>
+          <a:lstStyle/>
+          <a:p>
+            <a:r>
+              <a:rPr lang="fr-FR" dirty="0">
+                <a:solidFill>
+                  <a:srgbClr val="0070C0"/>
+                </a:solidFill>
+              </a:rPr>
+              <a:t>I.C.</a:t>
+            </a:r>
+          </a:p>
+        </p:txBody>
+      </p:sp>
     </p:spTree>
     <p:extLst>
       <p:ext uri="{BB962C8B-B14F-4D97-AF65-F5344CB8AC3E}">
         <p14:creationId xmlns:p14="http://schemas.microsoft.com/office/powerpoint/2010/main" val="847224446"/>
+      </p:ext>
+    </p:extLst>
+  </p:cSld>
+  <p:clrMapOvr>
+    <a:masterClrMapping/>
+  </p:clrMapOvr>
+</p:sld>
+</file>
+
+<file path=ppt/slides/slide2.xml><?xml version="1.0" encoding="utf-8"?>
+<p:sld xmlns:a="http://schemas.openxmlformats.org/drawingml/2006/main" xmlns:r="http://schemas.openxmlformats.org/officeDocument/2006/relationships" xmlns:p="http://schemas.openxmlformats.org/presentationml/2006/main">
+  <p:cSld>
+    <p:spTree>
+      <p:nvGrpSpPr>
+        <p:cNvPr id="1" name=""/>
+        <p:cNvGrpSpPr/>
+        <p:nvPr/>
+      </p:nvGrpSpPr>
+      <p:grpSpPr>
+        <a:xfrm>
+          <a:off x="0" y="0"/>
+          <a:ext cx="0" cy="0"/>
+          <a:chOff x="0" y="0"/>
+          <a:chExt cx="0" cy="0"/>
+        </a:xfrm>
+      </p:grpSpPr>
+      <p:sp>
+        <p:nvSpPr>
+          <p:cNvPr id="4" name="Rectangle : coins arrondis 3">
+            <a:extLst>
+              <a:ext uri="{FF2B5EF4-FFF2-40B4-BE49-F238E27FC236}">
+                <a16:creationId xmlns:a16="http://schemas.microsoft.com/office/drawing/2014/main" id="{80752132-7367-4FE5-A30F-BBC0A198B71F}"/>
+              </a:ext>
+            </a:extLst>
+          </p:cNvPr>
+          <p:cNvSpPr/>
+          <p:nvPr/>
+        </p:nvSpPr>
+        <p:spPr>
+          <a:xfrm>
+            <a:off x="2312125" y="3071232"/>
+            <a:ext cx="5695406" cy="678594"/>
+          </a:xfrm>
+          <a:prstGeom prst="roundRect">
+            <a:avLst/>
+          </a:prstGeom>
+          <a:ln/>
+        </p:spPr>
+        <p:style>
+          <a:lnRef idx="1">
+            <a:schemeClr val="accent5"/>
+          </a:lnRef>
+          <a:fillRef idx="2">
+            <a:schemeClr val="accent5"/>
+          </a:fillRef>
+          <a:effectRef idx="1">
+            <a:schemeClr val="accent5"/>
+          </a:effectRef>
+          <a:fontRef idx="minor">
+            <a:schemeClr val="dk1"/>
+          </a:fontRef>
+        </p:style>
+        <p:txBody>
+          <a:bodyPr rtlCol="0" anchor="ctr"/>
+          <a:lstStyle/>
+          <a:p>
+            <a:pPr algn="ctr"/>
+            <a:endParaRPr lang="fr-FR"/>
+          </a:p>
+        </p:txBody>
+      </p:sp>
+      <p:sp>
+        <p:nvSpPr>
+          <p:cNvPr id="5" name="ZoneTexte 4">
+            <a:extLst>
+              <a:ext uri="{FF2B5EF4-FFF2-40B4-BE49-F238E27FC236}">
+                <a16:creationId xmlns:a16="http://schemas.microsoft.com/office/drawing/2014/main" id="{9B8D91F3-6040-491A-8BEC-75A152DCF388}"/>
+              </a:ext>
+            </a:extLst>
+          </p:cNvPr>
+          <p:cNvSpPr txBox="1"/>
+          <p:nvPr/>
+        </p:nvSpPr>
+        <p:spPr>
+          <a:xfrm>
+            <a:off x="2416629" y="3247918"/>
+            <a:ext cx="1240971" cy="369332"/>
+          </a:xfrm>
+          <a:prstGeom prst="rect">
+            <a:avLst/>
+          </a:prstGeom>
+        </p:spPr>
+        <p:style>
+          <a:lnRef idx="0">
+            <a:schemeClr val="accent5"/>
+          </a:lnRef>
+          <a:fillRef idx="3">
+            <a:schemeClr val="accent5"/>
+          </a:fillRef>
+          <a:effectRef idx="3">
+            <a:schemeClr val="accent5"/>
+          </a:effectRef>
+          <a:fontRef idx="minor">
+            <a:schemeClr val="lt1"/>
+          </a:fontRef>
+        </p:style>
+        <p:txBody>
+          <a:bodyPr wrap="square" rtlCol="0">
+            <a:spAutoFit/>
+          </a:bodyPr>
+          <a:lstStyle/>
+          <a:p>
+            <a:r>
+              <a:rPr lang="fr-FR" dirty="0"/>
+              <a:t>Scanner</a:t>
+            </a:r>
+          </a:p>
+        </p:txBody>
+      </p:sp>
+      <p:sp>
+        <p:nvSpPr>
+          <p:cNvPr id="6" name="ZoneTexte 5">
+            <a:extLst>
+              <a:ext uri="{FF2B5EF4-FFF2-40B4-BE49-F238E27FC236}">
+                <a16:creationId xmlns:a16="http://schemas.microsoft.com/office/drawing/2014/main" id="{5A761DB9-7803-4BE7-A612-8C2599955D13}"/>
+              </a:ext>
+            </a:extLst>
+          </p:cNvPr>
+          <p:cNvSpPr txBox="1"/>
+          <p:nvPr/>
+        </p:nvSpPr>
+        <p:spPr>
+          <a:xfrm>
+            <a:off x="4554583" y="3247918"/>
+            <a:ext cx="1240971" cy="369332"/>
+          </a:xfrm>
+          <a:prstGeom prst="rect">
+            <a:avLst/>
+          </a:prstGeom>
+          <a:ln/>
+        </p:spPr>
+        <p:style>
+          <a:lnRef idx="0">
+            <a:schemeClr val="accent5"/>
+          </a:lnRef>
+          <a:fillRef idx="3">
+            <a:schemeClr val="accent5"/>
+          </a:fillRef>
+          <a:effectRef idx="3">
+            <a:schemeClr val="accent5"/>
+          </a:effectRef>
+          <a:fontRef idx="minor">
+            <a:schemeClr val="lt1"/>
+          </a:fontRef>
+        </p:style>
+        <p:txBody>
+          <a:bodyPr wrap="square" rtlCol="0">
+            <a:spAutoFit/>
+          </a:bodyPr>
+          <a:lstStyle/>
+          <a:p>
+            <a:r>
+              <a:rPr lang="fr-FR" dirty="0" err="1"/>
+              <a:t>Parser</a:t>
+            </a:r>
+            <a:endParaRPr lang="fr-FR" dirty="0"/>
+          </a:p>
+        </p:txBody>
+      </p:sp>
+      <p:sp>
+        <p:nvSpPr>
+          <p:cNvPr id="7" name="ZoneTexte 6">
+            <a:extLst>
+              <a:ext uri="{FF2B5EF4-FFF2-40B4-BE49-F238E27FC236}">
+                <a16:creationId xmlns:a16="http://schemas.microsoft.com/office/drawing/2014/main" id="{D229C370-7EE3-4033-99DC-DB2C853C601D}"/>
+              </a:ext>
+            </a:extLst>
+          </p:cNvPr>
+          <p:cNvSpPr txBox="1"/>
+          <p:nvPr/>
+        </p:nvSpPr>
+        <p:spPr>
+          <a:xfrm>
+            <a:off x="6692537" y="3247918"/>
+            <a:ext cx="1240971" cy="369332"/>
+          </a:xfrm>
+          <a:prstGeom prst="rect">
+            <a:avLst/>
+          </a:prstGeom>
+          <a:ln/>
+        </p:spPr>
+        <p:style>
+          <a:lnRef idx="0">
+            <a:schemeClr val="accent5"/>
+          </a:lnRef>
+          <a:fillRef idx="3">
+            <a:schemeClr val="accent5"/>
+          </a:fillRef>
+          <a:effectRef idx="3">
+            <a:schemeClr val="accent5"/>
+          </a:effectRef>
+          <a:fontRef idx="minor">
+            <a:schemeClr val="lt1"/>
+          </a:fontRef>
+        </p:style>
+        <p:txBody>
+          <a:bodyPr wrap="square" rtlCol="0">
+            <a:spAutoFit/>
+          </a:bodyPr>
+          <a:lstStyle/>
+          <a:p>
+            <a:r>
+              <a:rPr lang="fr-FR" dirty="0" err="1"/>
+              <a:t>Elaborator</a:t>
+            </a:r>
+            <a:endParaRPr lang="fr-FR" dirty="0"/>
+          </a:p>
+        </p:txBody>
+      </p:sp>
+      <p:cxnSp>
+        <p:nvCxnSpPr>
+          <p:cNvPr id="8" name="Connecteur droit avec flèche 7">
+            <a:extLst>
+              <a:ext uri="{FF2B5EF4-FFF2-40B4-BE49-F238E27FC236}">
+                <a16:creationId xmlns:a16="http://schemas.microsoft.com/office/drawing/2014/main" id="{AABC851C-D1ED-4847-8B70-6AEC025FCA02}"/>
+              </a:ext>
+            </a:extLst>
+          </p:cNvPr>
+          <p:cNvCxnSpPr>
+            <a:stCxn id="5" idx="3"/>
+            <a:endCxn id="6" idx="1"/>
+          </p:cNvCxnSpPr>
+          <p:nvPr/>
+        </p:nvCxnSpPr>
+        <p:spPr>
+          <a:xfrm>
+            <a:off x="3657600" y="3432584"/>
+            <a:ext cx="896983" cy="0"/>
+          </a:xfrm>
+          <a:prstGeom prst="straightConnector1">
+            <a:avLst/>
+          </a:prstGeom>
+          <a:ln>
+            <a:tailEnd type="triangle"/>
+          </a:ln>
+        </p:spPr>
+        <p:style>
+          <a:lnRef idx="3">
+            <a:schemeClr val="accent1"/>
+          </a:lnRef>
+          <a:fillRef idx="0">
+            <a:schemeClr val="accent1"/>
+          </a:fillRef>
+          <a:effectRef idx="2">
+            <a:schemeClr val="accent1"/>
+          </a:effectRef>
+          <a:fontRef idx="minor">
+            <a:schemeClr val="tx1"/>
+          </a:fontRef>
+        </p:style>
+      </p:cxnSp>
+      <p:cxnSp>
+        <p:nvCxnSpPr>
+          <p:cNvPr id="9" name="Connecteur droit avec flèche 8">
+            <a:extLst>
+              <a:ext uri="{FF2B5EF4-FFF2-40B4-BE49-F238E27FC236}">
+                <a16:creationId xmlns:a16="http://schemas.microsoft.com/office/drawing/2014/main" id="{B827E2BC-CCA6-4448-9089-C7C1EE8038DB}"/>
+              </a:ext>
+            </a:extLst>
+          </p:cNvPr>
+          <p:cNvCxnSpPr/>
+          <p:nvPr/>
+        </p:nvCxnSpPr>
+        <p:spPr>
+          <a:xfrm>
+            <a:off x="5795554" y="3432584"/>
+            <a:ext cx="896983" cy="0"/>
+          </a:xfrm>
+          <a:prstGeom prst="straightConnector1">
+            <a:avLst/>
+          </a:prstGeom>
+          <a:ln>
+            <a:tailEnd type="triangle"/>
+          </a:ln>
+        </p:spPr>
+        <p:style>
+          <a:lnRef idx="3">
+            <a:schemeClr val="accent1"/>
+          </a:lnRef>
+          <a:fillRef idx="0">
+            <a:schemeClr val="accent1"/>
+          </a:fillRef>
+          <a:effectRef idx="2">
+            <a:schemeClr val="accent1"/>
+          </a:effectRef>
+          <a:fontRef idx="minor">
+            <a:schemeClr val="tx1"/>
+          </a:fontRef>
+        </p:style>
+      </p:cxnSp>
+      <p:cxnSp>
+        <p:nvCxnSpPr>
+          <p:cNvPr id="10" name="Connecteur droit avec flèche 9">
+            <a:extLst>
+              <a:ext uri="{FF2B5EF4-FFF2-40B4-BE49-F238E27FC236}">
+                <a16:creationId xmlns:a16="http://schemas.microsoft.com/office/drawing/2014/main" id="{18C6A6DD-8EFF-4329-8FDB-6C389E8035EF}"/>
+              </a:ext>
+            </a:extLst>
+          </p:cNvPr>
+          <p:cNvCxnSpPr/>
+          <p:nvPr/>
+        </p:nvCxnSpPr>
+        <p:spPr>
+          <a:xfrm>
+            <a:off x="7933508" y="3416952"/>
+            <a:ext cx="896983" cy="0"/>
+          </a:xfrm>
+          <a:prstGeom prst="straightConnector1">
+            <a:avLst/>
+          </a:prstGeom>
+          <a:ln>
+            <a:tailEnd type="triangle"/>
+          </a:ln>
+        </p:spPr>
+        <p:style>
+          <a:lnRef idx="3">
+            <a:schemeClr val="accent1"/>
+          </a:lnRef>
+          <a:fillRef idx="0">
+            <a:schemeClr val="accent1"/>
+          </a:fillRef>
+          <a:effectRef idx="2">
+            <a:schemeClr val="accent1"/>
+          </a:effectRef>
+          <a:fontRef idx="minor">
+            <a:schemeClr val="tx1"/>
+          </a:fontRef>
+        </p:style>
+      </p:cxnSp>
+      <p:cxnSp>
+        <p:nvCxnSpPr>
+          <p:cNvPr id="11" name="Connecteur droit avec flèche 10">
+            <a:extLst>
+              <a:ext uri="{FF2B5EF4-FFF2-40B4-BE49-F238E27FC236}">
+                <a16:creationId xmlns:a16="http://schemas.microsoft.com/office/drawing/2014/main" id="{0D1866B9-160A-4BBD-9F47-F32AF0859A90}"/>
+              </a:ext>
+            </a:extLst>
+          </p:cNvPr>
+          <p:cNvCxnSpPr/>
+          <p:nvPr/>
+        </p:nvCxnSpPr>
+        <p:spPr>
+          <a:xfrm>
+            <a:off x="1519646" y="3426664"/>
+            <a:ext cx="896983" cy="0"/>
+          </a:xfrm>
+          <a:prstGeom prst="straightConnector1">
+            <a:avLst/>
+          </a:prstGeom>
+          <a:ln>
+            <a:tailEnd type="triangle"/>
+          </a:ln>
+        </p:spPr>
+        <p:style>
+          <a:lnRef idx="3">
+            <a:schemeClr val="accent1"/>
+          </a:lnRef>
+          <a:fillRef idx="0">
+            <a:schemeClr val="accent1"/>
+          </a:fillRef>
+          <a:effectRef idx="2">
+            <a:schemeClr val="accent1"/>
+          </a:effectRef>
+          <a:fontRef idx="minor">
+            <a:schemeClr val="tx1"/>
+          </a:fontRef>
+        </p:style>
+      </p:cxnSp>
+      <p:sp>
+        <p:nvSpPr>
+          <p:cNvPr id="12" name="ZoneTexte 11">
+            <a:extLst>
+              <a:ext uri="{FF2B5EF4-FFF2-40B4-BE49-F238E27FC236}">
+                <a16:creationId xmlns:a16="http://schemas.microsoft.com/office/drawing/2014/main" id="{84F2E325-F811-4D7D-B2A8-5E4F0B8412E5}"/>
+              </a:ext>
+            </a:extLst>
+          </p:cNvPr>
+          <p:cNvSpPr txBox="1"/>
+          <p:nvPr/>
+        </p:nvSpPr>
+        <p:spPr>
+          <a:xfrm>
+            <a:off x="1371600" y="3103498"/>
+            <a:ext cx="940525" cy="646331"/>
+          </a:xfrm>
+          <a:prstGeom prst="rect">
+            <a:avLst/>
+          </a:prstGeom>
+          <a:noFill/>
+        </p:spPr>
+        <p:txBody>
+          <a:bodyPr wrap="square" rtlCol="0">
+            <a:spAutoFit/>
+          </a:bodyPr>
+          <a:lstStyle/>
+          <a:p>
+            <a:r>
+              <a:rPr lang="fr-FR" dirty="0">
+                <a:solidFill>
+                  <a:srgbClr val="0070C0"/>
+                </a:solidFill>
+              </a:rPr>
+              <a:t>Source code</a:t>
+            </a:r>
+          </a:p>
+        </p:txBody>
+      </p:sp>
+      <p:sp>
+        <p:nvSpPr>
+          <p:cNvPr id="13" name="ZoneTexte 12">
+            <a:extLst>
+              <a:ext uri="{FF2B5EF4-FFF2-40B4-BE49-F238E27FC236}">
+                <a16:creationId xmlns:a16="http://schemas.microsoft.com/office/drawing/2014/main" id="{EA9F8CD2-5E71-4553-B27F-0FDBA0A3298F}"/>
+              </a:ext>
+            </a:extLst>
+          </p:cNvPr>
+          <p:cNvSpPr txBox="1"/>
+          <p:nvPr/>
+        </p:nvSpPr>
+        <p:spPr>
+          <a:xfrm>
+            <a:off x="3814354" y="3047949"/>
+            <a:ext cx="600891" cy="369332"/>
+          </a:xfrm>
+          <a:prstGeom prst="rect">
+            <a:avLst/>
+          </a:prstGeom>
+          <a:noFill/>
+        </p:spPr>
+        <p:txBody>
+          <a:bodyPr wrap="square" rtlCol="0">
+            <a:spAutoFit/>
+          </a:bodyPr>
+          <a:lstStyle/>
+          <a:p>
+            <a:r>
+              <a:rPr lang="fr-FR" dirty="0">
+                <a:solidFill>
+                  <a:srgbClr val="0070C0"/>
+                </a:solidFill>
+              </a:rPr>
+              <a:t>I.C.</a:t>
+            </a:r>
+          </a:p>
+        </p:txBody>
+      </p:sp>
+      <p:sp>
+        <p:nvSpPr>
+          <p:cNvPr id="14" name="ZoneTexte 13">
+            <a:extLst>
+              <a:ext uri="{FF2B5EF4-FFF2-40B4-BE49-F238E27FC236}">
+                <a16:creationId xmlns:a16="http://schemas.microsoft.com/office/drawing/2014/main" id="{C846D3D4-668C-4C7E-9626-914988658BF1}"/>
+              </a:ext>
+            </a:extLst>
+          </p:cNvPr>
+          <p:cNvSpPr txBox="1"/>
+          <p:nvPr/>
+        </p:nvSpPr>
+        <p:spPr>
+          <a:xfrm>
+            <a:off x="5943600" y="3071231"/>
+            <a:ext cx="600891" cy="369332"/>
+          </a:xfrm>
+          <a:prstGeom prst="rect">
+            <a:avLst/>
+          </a:prstGeom>
+          <a:noFill/>
+        </p:spPr>
+        <p:txBody>
+          <a:bodyPr wrap="square" rtlCol="0">
+            <a:spAutoFit/>
+          </a:bodyPr>
+          <a:lstStyle/>
+          <a:p>
+            <a:r>
+              <a:rPr lang="fr-FR" dirty="0">
+                <a:solidFill>
+                  <a:srgbClr val="0070C0"/>
+                </a:solidFill>
+              </a:rPr>
+              <a:t>I.C.</a:t>
+            </a:r>
+          </a:p>
+        </p:txBody>
+      </p:sp>
+      <p:sp>
+        <p:nvSpPr>
+          <p:cNvPr id="15" name="ZoneTexte 14">
+            <a:extLst>
+              <a:ext uri="{FF2B5EF4-FFF2-40B4-BE49-F238E27FC236}">
+                <a16:creationId xmlns:a16="http://schemas.microsoft.com/office/drawing/2014/main" id="{F084EC5E-8FCE-4F78-A5B9-B34C89097011}"/>
+              </a:ext>
+            </a:extLst>
+          </p:cNvPr>
+          <p:cNvSpPr txBox="1"/>
+          <p:nvPr/>
+        </p:nvSpPr>
+        <p:spPr>
+          <a:xfrm>
+            <a:off x="8329747" y="3103498"/>
+            <a:ext cx="1206137" cy="369332"/>
+          </a:xfrm>
+          <a:prstGeom prst="rect">
+            <a:avLst/>
+          </a:prstGeom>
+          <a:noFill/>
+        </p:spPr>
+        <p:txBody>
+          <a:bodyPr wrap="square" rtlCol="0">
+            <a:spAutoFit/>
+          </a:bodyPr>
+          <a:lstStyle/>
+          <a:p>
+            <a:r>
+              <a:rPr lang="fr-FR" dirty="0">
+                <a:solidFill>
+                  <a:srgbClr val="0070C0"/>
+                </a:solidFill>
+              </a:rPr>
+              <a:t>I.C.</a:t>
+            </a:r>
+          </a:p>
+        </p:txBody>
+      </p:sp>
+      <p:sp>
+        <p:nvSpPr>
+          <p:cNvPr id="16" name="Rectangle : coins arrondis 15">
+            <a:extLst>
+              <a:ext uri="{FF2B5EF4-FFF2-40B4-BE49-F238E27FC236}">
+                <a16:creationId xmlns:a16="http://schemas.microsoft.com/office/drawing/2014/main" id="{7C1FFD41-93BD-47D7-AD8A-F1BF9D7DB7B8}"/>
+              </a:ext>
+            </a:extLst>
+          </p:cNvPr>
+          <p:cNvSpPr/>
+          <p:nvPr/>
+        </p:nvSpPr>
+        <p:spPr>
+          <a:xfrm>
+            <a:off x="2312125" y="467367"/>
+            <a:ext cx="5695406" cy="678594"/>
+          </a:xfrm>
+          <a:prstGeom prst="roundRect">
+            <a:avLst/>
+          </a:prstGeom>
+          <a:ln/>
+        </p:spPr>
+        <p:style>
+          <a:lnRef idx="1">
+            <a:schemeClr val="accent5"/>
+          </a:lnRef>
+          <a:fillRef idx="2">
+            <a:schemeClr val="accent5"/>
+          </a:fillRef>
+          <a:effectRef idx="1">
+            <a:schemeClr val="accent5"/>
+          </a:effectRef>
+          <a:fontRef idx="minor">
+            <a:schemeClr val="dk1"/>
+          </a:fontRef>
+        </p:style>
+        <p:txBody>
+          <a:bodyPr rtlCol="0" anchor="ctr"/>
+          <a:lstStyle/>
+          <a:p>
+            <a:pPr algn="ctr"/>
+            <a:endParaRPr lang="fr-FR"/>
+          </a:p>
+        </p:txBody>
+      </p:sp>
+      <p:sp>
+        <p:nvSpPr>
+          <p:cNvPr id="17" name="ZoneTexte 16">
+            <a:extLst>
+              <a:ext uri="{FF2B5EF4-FFF2-40B4-BE49-F238E27FC236}">
+                <a16:creationId xmlns:a16="http://schemas.microsoft.com/office/drawing/2014/main" id="{1389CE03-9114-4516-A421-8E2BEBB52CC9}"/>
+              </a:ext>
+            </a:extLst>
+          </p:cNvPr>
+          <p:cNvSpPr txBox="1"/>
+          <p:nvPr/>
+        </p:nvSpPr>
+        <p:spPr>
+          <a:xfrm>
+            <a:off x="2416629" y="644053"/>
+            <a:ext cx="1240971" cy="369332"/>
+          </a:xfrm>
+          <a:prstGeom prst="rect">
+            <a:avLst/>
+          </a:prstGeom>
+        </p:spPr>
+        <p:style>
+          <a:lnRef idx="0">
+            <a:schemeClr val="accent5"/>
+          </a:lnRef>
+          <a:fillRef idx="3">
+            <a:schemeClr val="accent5"/>
+          </a:fillRef>
+          <a:effectRef idx="3">
+            <a:schemeClr val="accent5"/>
+          </a:effectRef>
+          <a:fontRef idx="minor">
+            <a:schemeClr val="lt1"/>
+          </a:fontRef>
+        </p:style>
+        <p:txBody>
+          <a:bodyPr wrap="square" rtlCol="0">
+            <a:spAutoFit/>
+          </a:bodyPr>
+          <a:lstStyle/>
+          <a:p>
+            <a:r>
+              <a:rPr lang="fr-FR" dirty="0"/>
+              <a:t>Scanner</a:t>
+            </a:r>
+          </a:p>
+        </p:txBody>
+      </p:sp>
+      <p:sp>
+        <p:nvSpPr>
+          <p:cNvPr id="18" name="ZoneTexte 17">
+            <a:extLst>
+              <a:ext uri="{FF2B5EF4-FFF2-40B4-BE49-F238E27FC236}">
+                <a16:creationId xmlns:a16="http://schemas.microsoft.com/office/drawing/2014/main" id="{726A70F5-4E27-4060-869C-221B08D27C97}"/>
+              </a:ext>
+            </a:extLst>
+          </p:cNvPr>
+          <p:cNvSpPr txBox="1"/>
+          <p:nvPr/>
+        </p:nvSpPr>
+        <p:spPr>
+          <a:xfrm>
+            <a:off x="4554583" y="644053"/>
+            <a:ext cx="1240971" cy="369332"/>
+          </a:xfrm>
+          <a:prstGeom prst="rect">
+            <a:avLst/>
+          </a:prstGeom>
+          <a:ln/>
+        </p:spPr>
+        <p:style>
+          <a:lnRef idx="0">
+            <a:schemeClr val="accent5"/>
+          </a:lnRef>
+          <a:fillRef idx="3">
+            <a:schemeClr val="accent5"/>
+          </a:fillRef>
+          <a:effectRef idx="3">
+            <a:schemeClr val="accent5"/>
+          </a:effectRef>
+          <a:fontRef idx="minor">
+            <a:schemeClr val="lt1"/>
+          </a:fontRef>
+        </p:style>
+        <p:txBody>
+          <a:bodyPr wrap="square" rtlCol="0">
+            <a:spAutoFit/>
+          </a:bodyPr>
+          <a:lstStyle/>
+          <a:p>
+            <a:r>
+              <a:rPr lang="fr-FR" dirty="0" err="1"/>
+              <a:t>Parser</a:t>
+            </a:r>
+            <a:endParaRPr lang="fr-FR" dirty="0"/>
+          </a:p>
+        </p:txBody>
+      </p:sp>
+      <p:sp>
+        <p:nvSpPr>
+          <p:cNvPr id="19" name="ZoneTexte 18">
+            <a:extLst>
+              <a:ext uri="{FF2B5EF4-FFF2-40B4-BE49-F238E27FC236}">
+                <a16:creationId xmlns:a16="http://schemas.microsoft.com/office/drawing/2014/main" id="{70CB56BB-154F-4B1B-B5CA-7042BB56653C}"/>
+              </a:ext>
+            </a:extLst>
+          </p:cNvPr>
+          <p:cNvSpPr txBox="1"/>
+          <p:nvPr/>
+        </p:nvSpPr>
+        <p:spPr>
+          <a:xfrm>
+            <a:off x="6692537" y="644053"/>
+            <a:ext cx="1240971" cy="369332"/>
+          </a:xfrm>
+          <a:prstGeom prst="rect">
+            <a:avLst/>
+          </a:prstGeom>
+          <a:ln/>
+        </p:spPr>
+        <p:style>
+          <a:lnRef idx="0">
+            <a:schemeClr val="accent5"/>
+          </a:lnRef>
+          <a:fillRef idx="3">
+            <a:schemeClr val="accent5"/>
+          </a:fillRef>
+          <a:effectRef idx="3">
+            <a:schemeClr val="accent5"/>
+          </a:effectRef>
+          <a:fontRef idx="minor">
+            <a:schemeClr val="lt1"/>
+          </a:fontRef>
+        </p:style>
+        <p:txBody>
+          <a:bodyPr wrap="square" rtlCol="0">
+            <a:spAutoFit/>
+          </a:bodyPr>
+          <a:lstStyle/>
+          <a:p>
+            <a:r>
+              <a:rPr lang="fr-FR" dirty="0" err="1"/>
+              <a:t>Elaborator</a:t>
+            </a:r>
+            <a:endParaRPr lang="fr-FR" dirty="0"/>
+          </a:p>
+        </p:txBody>
+      </p:sp>
+      <p:cxnSp>
+        <p:nvCxnSpPr>
+          <p:cNvPr id="20" name="Connecteur droit avec flèche 19">
+            <a:extLst>
+              <a:ext uri="{FF2B5EF4-FFF2-40B4-BE49-F238E27FC236}">
+                <a16:creationId xmlns:a16="http://schemas.microsoft.com/office/drawing/2014/main" id="{7159A762-3458-426A-83AA-6EA31CA3BCE4}"/>
+              </a:ext>
+            </a:extLst>
+          </p:cNvPr>
+          <p:cNvCxnSpPr>
+            <a:stCxn id="17" idx="3"/>
+            <a:endCxn id="18" idx="1"/>
+          </p:cNvCxnSpPr>
+          <p:nvPr/>
+        </p:nvCxnSpPr>
+        <p:spPr>
+          <a:xfrm>
+            <a:off x="3657600" y="828719"/>
+            <a:ext cx="896983" cy="0"/>
+          </a:xfrm>
+          <a:prstGeom prst="straightConnector1">
+            <a:avLst/>
+          </a:prstGeom>
+          <a:ln>
+            <a:tailEnd type="triangle"/>
+          </a:ln>
+        </p:spPr>
+        <p:style>
+          <a:lnRef idx="3">
+            <a:schemeClr val="accent1"/>
+          </a:lnRef>
+          <a:fillRef idx="0">
+            <a:schemeClr val="accent1"/>
+          </a:fillRef>
+          <a:effectRef idx="2">
+            <a:schemeClr val="accent1"/>
+          </a:effectRef>
+          <a:fontRef idx="minor">
+            <a:schemeClr val="tx1"/>
+          </a:fontRef>
+        </p:style>
+      </p:cxnSp>
+      <p:cxnSp>
+        <p:nvCxnSpPr>
+          <p:cNvPr id="21" name="Connecteur droit avec flèche 20">
+            <a:extLst>
+              <a:ext uri="{FF2B5EF4-FFF2-40B4-BE49-F238E27FC236}">
+                <a16:creationId xmlns:a16="http://schemas.microsoft.com/office/drawing/2014/main" id="{BB155810-6C8D-4726-91A6-99F2EECF940D}"/>
+              </a:ext>
+            </a:extLst>
+          </p:cNvPr>
+          <p:cNvCxnSpPr/>
+          <p:nvPr/>
+        </p:nvCxnSpPr>
+        <p:spPr>
+          <a:xfrm>
+            <a:off x="5795554" y="828719"/>
+            <a:ext cx="896983" cy="0"/>
+          </a:xfrm>
+          <a:prstGeom prst="straightConnector1">
+            <a:avLst/>
+          </a:prstGeom>
+          <a:ln>
+            <a:tailEnd type="triangle"/>
+          </a:ln>
+        </p:spPr>
+        <p:style>
+          <a:lnRef idx="3">
+            <a:schemeClr val="accent1"/>
+          </a:lnRef>
+          <a:fillRef idx="0">
+            <a:schemeClr val="accent1"/>
+          </a:fillRef>
+          <a:effectRef idx="2">
+            <a:schemeClr val="accent1"/>
+          </a:effectRef>
+          <a:fontRef idx="minor">
+            <a:schemeClr val="tx1"/>
+          </a:fontRef>
+        </p:style>
+      </p:cxnSp>
+      <p:cxnSp>
+        <p:nvCxnSpPr>
+          <p:cNvPr id="22" name="Connecteur droit avec flèche 21">
+            <a:extLst>
+              <a:ext uri="{FF2B5EF4-FFF2-40B4-BE49-F238E27FC236}">
+                <a16:creationId xmlns:a16="http://schemas.microsoft.com/office/drawing/2014/main" id="{F41DB65A-BD92-449A-B853-2FCB4F39DB42}"/>
+              </a:ext>
+            </a:extLst>
+          </p:cNvPr>
+          <p:cNvCxnSpPr/>
+          <p:nvPr/>
+        </p:nvCxnSpPr>
+        <p:spPr>
+          <a:xfrm>
+            <a:off x="7933508" y="813087"/>
+            <a:ext cx="896983" cy="0"/>
+          </a:xfrm>
+          <a:prstGeom prst="straightConnector1">
+            <a:avLst/>
+          </a:prstGeom>
+          <a:ln>
+            <a:tailEnd type="triangle"/>
+          </a:ln>
+        </p:spPr>
+        <p:style>
+          <a:lnRef idx="3">
+            <a:schemeClr val="accent1"/>
+          </a:lnRef>
+          <a:fillRef idx="0">
+            <a:schemeClr val="accent1"/>
+          </a:fillRef>
+          <a:effectRef idx="2">
+            <a:schemeClr val="accent1"/>
+          </a:effectRef>
+          <a:fontRef idx="minor">
+            <a:schemeClr val="tx1"/>
+          </a:fontRef>
+        </p:style>
+      </p:cxnSp>
+      <p:cxnSp>
+        <p:nvCxnSpPr>
+          <p:cNvPr id="23" name="Connecteur droit avec flèche 22">
+            <a:extLst>
+              <a:ext uri="{FF2B5EF4-FFF2-40B4-BE49-F238E27FC236}">
+                <a16:creationId xmlns:a16="http://schemas.microsoft.com/office/drawing/2014/main" id="{9D79F7BA-24A6-4FA9-821F-86105E3ED9FC}"/>
+              </a:ext>
+            </a:extLst>
+          </p:cNvPr>
+          <p:cNvCxnSpPr/>
+          <p:nvPr/>
+        </p:nvCxnSpPr>
+        <p:spPr>
+          <a:xfrm>
+            <a:off x="1519646" y="822799"/>
+            <a:ext cx="896983" cy="0"/>
+          </a:xfrm>
+          <a:prstGeom prst="straightConnector1">
+            <a:avLst/>
+          </a:prstGeom>
+          <a:ln>
+            <a:tailEnd type="triangle"/>
+          </a:ln>
+        </p:spPr>
+        <p:style>
+          <a:lnRef idx="3">
+            <a:schemeClr val="accent1"/>
+          </a:lnRef>
+          <a:fillRef idx="0">
+            <a:schemeClr val="accent1"/>
+          </a:fillRef>
+          <a:effectRef idx="2">
+            <a:schemeClr val="accent1"/>
+          </a:effectRef>
+          <a:fontRef idx="minor">
+            <a:schemeClr val="tx1"/>
+          </a:fontRef>
+        </p:style>
+      </p:cxnSp>
+      <p:sp>
+        <p:nvSpPr>
+          <p:cNvPr id="24" name="ZoneTexte 23">
+            <a:extLst>
+              <a:ext uri="{FF2B5EF4-FFF2-40B4-BE49-F238E27FC236}">
+                <a16:creationId xmlns:a16="http://schemas.microsoft.com/office/drawing/2014/main" id="{8ADF8DDE-C802-45FF-A6A3-5E7BE597E53B}"/>
+              </a:ext>
+            </a:extLst>
+          </p:cNvPr>
+          <p:cNvSpPr txBox="1"/>
+          <p:nvPr/>
+        </p:nvSpPr>
+        <p:spPr>
+          <a:xfrm>
+            <a:off x="1371600" y="499633"/>
+            <a:ext cx="940525" cy="646331"/>
+          </a:xfrm>
+          <a:prstGeom prst="rect">
+            <a:avLst/>
+          </a:prstGeom>
+          <a:noFill/>
+        </p:spPr>
+        <p:txBody>
+          <a:bodyPr wrap="square" rtlCol="0">
+            <a:spAutoFit/>
+          </a:bodyPr>
+          <a:lstStyle/>
+          <a:p>
+            <a:r>
+              <a:rPr lang="fr-FR" dirty="0">
+                <a:solidFill>
+                  <a:srgbClr val="0070C0"/>
+                </a:solidFill>
+              </a:rPr>
+              <a:t>Source code</a:t>
+            </a:r>
+          </a:p>
+        </p:txBody>
+      </p:sp>
+      <p:sp>
+        <p:nvSpPr>
+          <p:cNvPr id="25" name="ZoneTexte 24">
+            <a:extLst>
+              <a:ext uri="{FF2B5EF4-FFF2-40B4-BE49-F238E27FC236}">
+                <a16:creationId xmlns:a16="http://schemas.microsoft.com/office/drawing/2014/main" id="{5942F756-73FB-43A2-BA0C-5EEA80BF5D95}"/>
+              </a:ext>
+            </a:extLst>
+          </p:cNvPr>
+          <p:cNvSpPr txBox="1"/>
+          <p:nvPr/>
+        </p:nvSpPr>
+        <p:spPr>
+          <a:xfrm>
+            <a:off x="3814354" y="444084"/>
+            <a:ext cx="600891" cy="369332"/>
+          </a:xfrm>
+          <a:prstGeom prst="rect">
+            <a:avLst/>
+          </a:prstGeom>
+          <a:noFill/>
+        </p:spPr>
+        <p:txBody>
+          <a:bodyPr wrap="square" rtlCol="0">
+            <a:spAutoFit/>
+          </a:bodyPr>
+          <a:lstStyle/>
+          <a:p>
+            <a:r>
+              <a:rPr lang="fr-FR" dirty="0">
+                <a:solidFill>
+                  <a:srgbClr val="0070C0"/>
+                </a:solidFill>
+              </a:rPr>
+              <a:t>I.C.</a:t>
+            </a:r>
+          </a:p>
+        </p:txBody>
+      </p:sp>
+      <p:sp>
+        <p:nvSpPr>
+          <p:cNvPr id="26" name="ZoneTexte 25">
+            <a:extLst>
+              <a:ext uri="{FF2B5EF4-FFF2-40B4-BE49-F238E27FC236}">
+                <a16:creationId xmlns:a16="http://schemas.microsoft.com/office/drawing/2014/main" id="{9EC0011F-1419-4EEE-A97E-4FC1C97DFFDD}"/>
+              </a:ext>
+            </a:extLst>
+          </p:cNvPr>
+          <p:cNvSpPr txBox="1"/>
+          <p:nvPr/>
+        </p:nvSpPr>
+        <p:spPr>
+          <a:xfrm>
+            <a:off x="5943600" y="467366"/>
+            <a:ext cx="600891" cy="369332"/>
+          </a:xfrm>
+          <a:prstGeom prst="rect">
+            <a:avLst/>
+          </a:prstGeom>
+          <a:noFill/>
+        </p:spPr>
+        <p:txBody>
+          <a:bodyPr wrap="square" rtlCol="0">
+            <a:spAutoFit/>
+          </a:bodyPr>
+          <a:lstStyle/>
+          <a:p>
+            <a:r>
+              <a:rPr lang="fr-FR" dirty="0">
+                <a:solidFill>
+                  <a:srgbClr val="0070C0"/>
+                </a:solidFill>
+              </a:rPr>
+              <a:t>I.C.</a:t>
+            </a:r>
+          </a:p>
+        </p:txBody>
+      </p:sp>
+      <p:sp>
+        <p:nvSpPr>
+          <p:cNvPr id="27" name="ZoneTexte 26">
+            <a:extLst>
+              <a:ext uri="{FF2B5EF4-FFF2-40B4-BE49-F238E27FC236}">
+                <a16:creationId xmlns:a16="http://schemas.microsoft.com/office/drawing/2014/main" id="{CE478F62-2161-43A1-8D2E-F9B44AC67B35}"/>
+              </a:ext>
+            </a:extLst>
+          </p:cNvPr>
+          <p:cNvSpPr txBox="1"/>
+          <p:nvPr/>
+        </p:nvSpPr>
+        <p:spPr>
+          <a:xfrm>
+            <a:off x="8329747" y="499633"/>
+            <a:ext cx="1206137" cy="369332"/>
+          </a:xfrm>
+          <a:prstGeom prst="rect">
+            <a:avLst/>
+          </a:prstGeom>
+          <a:noFill/>
+        </p:spPr>
+        <p:txBody>
+          <a:bodyPr wrap="square" rtlCol="0">
+            <a:spAutoFit/>
+          </a:bodyPr>
+          <a:lstStyle/>
+          <a:p>
+            <a:r>
+              <a:rPr lang="fr-FR" dirty="0">
+                <a:solidFill>
+                  <a:srgbClr val="0070C0"/>
+                </a:solidFill>
+              </a:rPr>
+              <a:t>I.C.</a:t>
+            </a:r>
+          </a:p>
+        </p:txBody>
+      </p:sp>
+      <p:sp>
+        <p:nvSpPr>
+          <p:cNvPr id="28" name="Rectangle : coins arrondis 27">
+            <a:extLst>
+              <a:ext uri="{FF2B5EF4-FFF2-40B4-BE49-F238E27FC236}">
+                <a16:creationId xmlns:a16="http://schemas.microsoft.com/office/drawing/2014/main" id="{BCAA6991-DFDE-45D5-8E12-2692D3DB41FA}"/>
+              </a:ext>
+            </a:extLst>
+          </p:cNvPr>
+          <p:cNvSpPr/>
+          <p:nvPr/>
+        </p:nvSpPr>
+        <p:spPr>
+          <a:xfrm>
+            <a:off x="2312125" y="1693878"/>
+            <a:ext cx="5695406" cy="678594"/>
+          </a:xfrm>
+          <a:prstGeom prst="roundRect">
+            <a:avLst/>
+          </a:prstGeom>
+          <a:ln/>
+        </p:spPr>
+        <p:style>
+          <a:lnRef idx="1">
+            <a:schemeClr val="accent5"/>
+          </a:lnRef>
+          <a:fillRef idx="2">
+            <a:schemeClr val="accent5"/>
+          </a:fillRef>
+          <a:effectRef idx="1">
+            <a:schemeClr val="accent5"/>
+          </a:effectRef>
+          <a:fontRef idx="minor">
+            <a:schemeClr val="dk1"/>
+          </a:fontRef>
+        </p:style>
+        <p:txBody>
+          <a:bodyPr rtlCol="0" anchor="ctr"/>
+          <a:lstStyle/>
+          <a:p>
+            <a:pPr algn="ctr"/>
+            <a:endParaRPr lang="fr-FR"/>
+          </a:p>
+        </p:txBody>
+      </p:sp>
+      <p:sp>
+        <p:nvSpPr>
+          <p:cNvPr id="29" name="ZoneTexte 28">
+            <a:extLst>
+              <a:ext uri="{FF2B5EF4-FFF2-40B4-BE49-F238E27FC236}">
+                <a16:creationId xmlns:a16="http://schemas.microsoft.com/office/drawing/2014/main" id="{EEC9C088-9EC4-42B1-A92C-0A279911C42B}"/>
+              </a:ext>
+            </a:extLst>
+          </p:cNvPr>
+          <p:cNvSpPr txBox="1"/>
+          <p:nvPr/>
+        </p:nvSpPr>
+        <p:spPr>
+          <a:xfrm>
+            <a:off x="2416629" y="1870564"/>
+            <a:ext cx="1240971" cy="369332"/>
+          </a:xfrm>
+          <a:prstGeom prst="rect">
+            <a:avLst/>
+          </a:prstGeom>
+        </p:spPr>
+        <p:style>
+          <a:lnRef idx="0">
+            <a:schemeClr val="accent5"/>
+          </a:lnRef>
+          <a:fillRef idx="3">
+            <a:schemeClr val="accent5"/>
+          </a:fillRef>
+          <a:effectRef idx="3">
+            <a:schemeClr val="accent5"/>
+          </a:effectRef>
+          <a:fontRef idx="minor">
+            <a:schemeClr val="lt1"/>
+          </a:fontRef>
+        </p:style>
+        <p:txBody>
+          <a:bodyPr wrap="square" rtlCol="0">
+            <a:spAutoFit/>
+          </a:bodyPr>
+          <a:lstStyle/>
+          <a:p>
+            <a:r>
+              <a:rPr lang="fr-FR" dirty="0"/>
+              <a:t>Scanner</a:t>
+            </a:r>
+          </a:p>
+        </p:txBody>
+      </p:sp>
+      <p:sp>
+        <p:nvSpPr>
+          <p:cNvPr id="30" name="ZoneTexte 29">
+            <a:extLst>
+              <a:ext uri="{FF2B5EF4-FFF2-40B4-BE49-F238E27FC236}">
+                <a16:creationId xmlns:a16="http://schemas.microsoft.com/office/drawing/2014/main" id="{8C7A2A94-FED2-4415-A794-87F44271B7FA}"/>
+              </a:ext>
+            </a:extLst>
+          </p:cNvPr>
+          <p:cNvSpPr txBox="1"/>
+          <p:nvPr/>
+        </p:nvSpPr>
+        <p:spPr>
+          <a:xfrm>
+            <a:off x="4554583" y="1870564"/>
+            <a:ext cx="1240971" cy="369332"/>
+          </a:xfrm>
+          <a:prstGeom prst="rect">
+            <a:avLst/>
+          </a:prstGeom>
+          <a:ln/>
+        </p:spPr>
+        <p:style>
+          <a:lnRef idx="0">
+            <a:schemeClr val="accent5"/>
+          </a:lnRef>
+          <a:fillRef idx="3">
+            <a:schemeClr val="accent5"/>
+          </a:fillRef>
+          <a:effectRef idx="3">
+            <a:schemeClr val="accent5"/>
+          </a:effectRef>
+          <a:fontRef idx="minor">
+            <a:schemeClr val="lt1"/>
+          </a:fontRef>
+        </p:style>
+        <p:txBody>
+          <a:bodyPr wrap="square" rtlCol="0">
+            <a:spAutoFit/>
+          </a:bodyPr>
+          <a:lstStyle/>
+          <a:p>
+            <a:r>
+              <a:rPr lang="fr-FR" dirty="0" err="1"/>
+              <a:t>Parser</a:t>
+            </a:r>
+            <a:endParaRPr lang="fr-FR" dirty="0"/>
+          </a:p>
+        </p:txBody>
+      </p:sp>
+      <p:sp>
+        <p:nvSpPr>
+          <p:cNvPr id="31" name="ZoneTexte 30">
+            <a:extLst>
+              <a:ext uri="{FF2B5EF4-FFF2-40B4-BE49-F238E27FC236}">
+                <a16:creationId xmlns:a16="http://schemas.microsoft.com/office/drawing/2014/main" id="{B5685982-6DB2-4017-8A9B-D89854737479}"/>
+              </a:ext>
+            </a:extLst>
+          </p:cNvPr>
+          <p:cNvSpPr txBox="1"/>
+          <p:nvPr/>
+        </p:nvSpPr>
+        <p:spPr>
+          <a:xfrm>
+            <a:off x="6692537" y="1870564"/>
+            <a:ext cx="1240971" cy="369332"/>
+          </a:xfrm>
+          <a:prstGeom prst="rect">
+            <a:avLst/>
+          </a:prstGeom>
+          <a:ln/>
+        </p:spPr>
+        <p:style>
+          <a:lnRef idx="0">
+            <a:schemeClr val="accent5"/>
+          </a:lnRef>
+          <a:fillRef idx="3">
+            <a:schemeClr val="accent5"/>
+          </a:fillRef>
+          <a:effectRef idx="3">
+            <a:schemeClr val="accent5"/>
+          </a:effectRef>
+          <a:fontRef idx="minor">
+            <a:schemeClr val="lt1"/>
+          </a:fontRef>
+        </p:style>
+        <p:txBody>
+          <a:bodyPr wrap="square" rtlCol="0">
+            <a:spAutoFit/>
+          </a:bodyPr>
+          <a:lstStyle/>
+          <a:p>
+            <a:r>
+              <a:rPr lang="fr-FR" dirty="0" err="1"/>
+              <a:t>Elaborator</a:t>
+            </a:r>
+            <a:endParaRPr lang="fr-FR" dirty="0"/>
+          </a:p>
+        </p:txBody>
+      </p:sp>
+      <p:cxnSp>
+        <p:nvCxnSpPr>
+          <p:cNvPr id="32" name="Connecteur droit avec flèche 31">
+            <a:extLst>
+              <a:ext uri="{FF2B5EF4-FFF2-40B4-BE49-F238E27FC236}">
+                <a16:creationId xmlns:a16="http://schemas.microsoft.com/office/drawing/2014/main" id="{5F8D8EAD-398E-4840-9758-ED80FA6A80F1}"/>
+              </a:ext>
+            </a:extLst>
+          </p:cNvPr>
+          <p:cNvCxnSpPr>
+            <a:stCxn id="29" idx="3"/>
+            <a:endCxn id="30" idx="1"/>
+          </p:cNvCxnSpPr>
+          <p:nvPr/>
+        </p:nvCxnSpPr>
+        <p:spPr>
+          <a:xfrm>
+            <a:off x="3657600" y="2055230"/>
+            <a:ext cx="896983" cy="0"/>
+          </a:xfrm>
+          <a:prstGeom prst="straightConnector1">
+            <a:avLst/>
+          </a:prstGeom>
+          <a:ln>
+            <a:tailEnd type="triangle"/>
+          </a:ln>
+        </p:spPr>
+        <p:style>
+          <a:lnRef idx="3">
+            <a:schemeClr val="accent1"/>
+          </a:lnRef>
+          <a:fillRef idx="0">
+            <a:schemeClr val="accent1"/>
+          </a:fillRef>
+          <a:effectRef idx="2">
+            <a:schemeClr val="accent1"/>
+          </a:effectRef>
+          <a:fontRef idx="minor">
+            <a:schemeClr val="tx1"/>
+          </a:fontRef>
+        </p:style>
+      </p:cxnSp>
+      <p:cxnSp>
+        <p:nvCxnSpPr>
+          <p:cNvPr id="33" name="Connecteur droit avec flèche 32">
+            <a:extLst>
+              <a:ext uri="{FF2B5EF4-FFF2-40B4-BE49-F238E27FC236}">
+                <a16:creationId xmlns:a16="http://schemas.microsoft.com/office/drawing/2014/main" id="{2CB9BD05-CFFC-462D-A854-881F2AB1B589}"/>
+              </a:ext>
+            </a:extLst>
+          </p:cNvPr>
+          <p:cNvCxnSpPr/>
+          <p:nvPr/>
+        </p:nvCxnSpPr>
+        <p:spPr>
+          <a:xfrm>
+            <a:off x="5795554" y="2055230"/>
+            <a:ext cx="896983" cy="0"/>
+          </a:xfrm>
+          <a:prstGeom prst="straightConnector1">
+            <a:avLst/>
+          </a:prstGeom>
+          <a:ln>
+            <a:tailEnd type="triangle"/>
+          </a:ln>
+        </p:spPr>
+        <p:style>
+          <a:lnRef idx="3">
+            <a:schemeClr val="accent1"/>
+          </a:lnRef>
+          <a:fillRef idx="0">
+            <a:schemeClr val="accent1"/>
+          </a:fillRef>
+          <a:effectRef idx="2">
+            <a:schemeClr val="accent1"/>
+          </a:effectRef>
+          <a:fontRef idx="minor">
+            <a:schemeClr val="tx1"/>
+          </a:fontRef>
+        </p:style>
+      </p:cxnSp>
+      <p:cxnSp>
+        <p:nvCxnSpPr>
+          <p:cNvPr id="34" name="Connecteur droit avec flèche 33">
+            <a:extLst>
+              <a:ext uri="{FF2B5EF4-FFF2-40B4-BE49-F238E27FC236}">
+                <a16:creationId xmlns:a16="http://schemas.microsoft.com/office/drawing/2014/main" id="{5C82CA58-8C77-43A4-B39A-813406DBEE6D}"/>
+              </a:ext>
+            </a:extLst>
+          </p:cNvPr>
+          <p:cNvCxnSpPr/>
+          <p:nvPr/>
+        </p:nvCxnSpPr>
+        <p:spPr>
+          <a:xfrm>
+            <a:off x="7933508" y="2039598"/>
+            <a:ext cx="896983" cy="0"/>
+          </a:xfrm>
+          <a:prstGeom prst="straightConnector1">
+            <a:avLst/>
+          </a:prstGeom>
+          <a:ln>
+            <a:tailEnd type="triangle"/>
+          </a:ln>
+        </p:spPr>
+        <p:style>
+          <a:lnRef idx="3">
+            <a:schemeClr val="accent1"/>
+          </a:lnRef>
+          <a:fillRef idx="0">
+            <a:schemeClr val="accent1"/>
+          </a:fillRef>
+          <a:effectRef idx="2">
+            <a:schemeClr val="accent1"/>
+          </a:effectRef>
+          <a:fontRef idx="minor">
+            <a:schemeClr val="tx1"/>
+          </a:fontRef>
+        </p:style>
+      </p:cxnSp>
+      <p:cxnSp>
+        <p:nvCxnSpPr>
+          <p:cNvPr id="35" name="Connecteur droit avec flèche 34">
+            <a:extLst>
+              <a:ext uri="{FF2B5EF4-FFF2-40B4-BE49-F238E27FC236}">
+                <a16:creationId xmlns:a16="http://schemas.microsoft.com/office/drawing/2014/main" id="{1D6CA17F-A41E-4B4C-BCC5-CDCC705B1F85}"/>
+              </a:ext>
+            </a:extLst>
+          </p:cNvPr>
+          <p:cNvCxnSpPr/>
+          <p:nvPr/>
+        </p:nvCxnSpPr>
+        <p:spPr>
+          <a:xfrm>
+            <a:off x="1519646" y="2049310"/>
+            <a:ext cx="896983" cy="0"/>
+          </a:xfrm>
+          <a:prstGeom prst="straightConnector1">
+            <a:avLst/>
+          </a:prstGeom>
+          <a:ln>
+            <a:tailEnd type="triangle"/>
+          </a:ln>
+        </p:spPr>
+        <p:style>
+          <a:lnRef idx="3">
+            <a:schemeClr val="accent1"/>
+          </a:lnRef>
+          <a:fillRef idx="0">
+            <a:schemeClr val="accent1"/>
+          </a:fillRef>
+          <a:effectRef idx="2">
+            <a:schemeClr val="accent1"/>
+          </a:effectRef>
+          <a:fontRef idx="minor">
+            <a:schemeClr val="tx1"/>
+          </a:fontRef>
+        </p:style>
+      </p:cxnSp>
+      <p:sp>
+        <p:nvSpPr>
+          <p:cNvPr id="36" name="ZoneTexte 35">
+            <a:extLst>
+              <a:ext uri="{FF2B5EF4-FFF2-40B4-BE49-F238E27FC236}">
+                <a16:creationId xmlns:a16="http://schemas.microsoft.com/office/drawing/2014/main" id="{D3EDBFE1-BFF4-45D3-A0E2-6FF008146A5A}"/>
+              </a:ext>
+            </a:extLst>
+          </p:cNvPr>
+          <p:cNvSpPr txBox="1"/>
+          <p:nvPr/>
+        </p:nvSpPr>
+        <p:spPr>
+          <a:xfrm>
+            <a:off x="1371600" y="1726144"/>
+            <a:ext cx="940525" cy="646331"/>
+          </a:xfrm>
+          <a:prstGeom prst="rect">
+            <a:avLst/>
+          </a:prstGeom>
+          <a:noFill/>
+        </p:spPr>
+        <p:txBody>
+          <a:bodyPr wrap="square" rtlCol="0">
+            <a:spAutoFit/>
+          </a:bodyPr>
+          <a:lstStyle/>
+          <a:p>
+            <a:r>
+              <a:rPr lang="fr-FR" dirty="0">
+                <a:solidFill>
+                  <a:srgbClr val="0070C0"/>
+                </a:solidFill>
+              </a:rPr>
+              <a:t>Source code</a:t>
+            </a:r>
+          </a:p>
+        </p:txBody>
+      </p:sp>
+      <p:sp>
+        <p:nvSpPr>
+          <p:cNvPr id="37" name="ZoneTexte 36">
+            <a:extLst>
+              <a:ext uri="{FF2B5EF4-FFF2-40B4-BE49-F238E27FC236}">
+                <a16:creationId xmlns:a16="http://schemas.microsoft.com/office/drawing/2014/main" id="{F66316ED-EFBF-4875-94B9-0A83642FDDE4}"/>
+              </a:ext>
+            </a:extLst>
+          </p:cNvPr>
+          <p:cNvSpPr txBox="1"/>
+          <p:nvPr/>
+        </p:nvSpPr>
+        <p:spPr>
+          <a:xfrm>
+            <a:off x="3814354" y="1670595"/>
+            <a:ext cx="600891" cy="369332"/>
+          </a:xfrm>
+          <a:prstGeom prst="rect">
+            <a:avLst/>
+          </a:prstGeom>
+          <a:noFill/>
+        </p:spPr>
+        <p:txBody>
+          <a:bodyPr wrap="square" rtlCol="0">
+            <a:spAutoFit/>
+          </a:bodyPr>
+          <a:lstStyle/>
+          <a:p>
+            <a:r>
+              <a:rPr lang="fr-FR" dirty="0">
+                <a:solidFill>
+                  <a:srgbClr val="0070C0"/>
+                </a:solidFill>
+              </a:rPr>
+              <a:t>I.C.</a:t>
+            </a:r>
+          </a:p>
+        </p:txBody>
+      </p:sp>
+      <p:sp>
+        <p:nvSpPr>
+          <p:cNvPr id="38" name="ZoneTexte 37">
+            <a:extLst>
+              <a:ext uri="{FF2B5EF4-FFF2-40B4-BE49-F238E27FC236}">
+                <a16:creationId xmlns:a16="http://schemas.microsoft.com/office/drawing/2014/main" id="{E7E55E72-5818-4093-88AB-1B98DB3B4433}"/>
+              </a:ext>
+            </a:extLst>
+          </p:cNvPr>
+          <p:cNvSpPr txBox="1"/>
+          <p:nvPr/>
+        </p:nvSpPr>
+        <p:spPr>
+          <a:xfrm>
+            <a:off x="5943600" y="1693877"/>
+            <a:ext cx="600891" cy="369332"/>
+          </a:xfrm>
+          <a:prstGeom prst="rect">
+            <a:avLst/>
+          </a:prstGeom>
+          <a:noFill/>
+        </p:spPr>
+        <p:txBody>
+          <a:bodyPr wrap="square" rtlCol="0">
+            <a:spAutoFit/>
+          </a:bodyPr>
+          <a:lstStyle/>
+          <a:p>
+            <a:r>
+              <a:rPr lang="fr-FR" dirty="0">
+                <a:solidFill>
+                  <a:srgbClr val="0070C0"/>
+                </a:solidFill>
+              </a:rPr>
+              <a:t>I.C.</a:t>
+            </a:r>
+          </a:p>
+        </p:txBody>
+      </p:sp>
+      <p:sp>
+        <p:nvSpPr>
+          <p:cNvPr id="39" name="ZoneTexte 38">
+            <a:extLst>
+              <a:ext uri="{FF2B5EF4-FFF2-40B4-BE49-F238E27FC236}">
+                <a16:creationId xmlns:a16="http://schemas.microsoft.com/office/drawing/2014/main" id="{E6C95427-A865-4B7A-9B83-A5895B9A5539}"/>
+              </a:ext>
+            </a:extLst>
+          </p:cNvPr>
+          <p:cNvSpPr txBox="1"/>
+          <p:nvPr/>
+        </p:nvSpPr>
+        <p:spPr>
+          <a:xfrm>
+            <a:off x="8329747" y="1726144"/>
+            <a:ext cx="1206137" cy="369332"/>
+          </a:xfrm>
+          <a:prstGeom prst="rect">
+            <a:avLst/>
+          </a:prstGeom>
+          <a:noFill/>
+        </p:spPr>
+        <p:txBody>
+          <a:bodyPr wrap="square" rtlCol="0">
+            <a:spAutoFit/>
+          </a:bodyPr>
+          <a:lstStyle/>
+          <a:p>
+            <a:r>
+              <a:rPr lang="fr-FR" dirty="0">
+                <a:solidFill>
+                  <a:srgbClr val="0070C0"/>
+                </a:solidFill>
+              </a:rPr>
+              <a:t>I.C.</a:t>
+            </a:r>
+          </a:p>
+        </p:txBody>
+      </p:sp>
+    </p:spTree>
+    <p:extLst>
+      <p:ext uri="{BB962C8B-B14F-4D97-AF65-F5344CB8AC3E}">
+        <p14:creationId xmlns:p14="http://schemas.microsoft.com/office/powerpoint/2010/main" val="1229816572"/>
       </p:ext>
     </p:extLst>
   </p:cSld>

</xml_diff>